<commit_message>
frontend route fix, acc route, ppt
</commit_message>
<xml_diff>
--- a/미니프로젝트계획서.pptx
+++ b/미니프로젝트계획서.pptx
@@ -260,7 +260,7 @@
       <p15:sldGuideLst xmlns:p15="http://schemas.microsoft.com/office/powerpoint/2012/main"/>
     </p:ext>
     <p:ext uri="GoogleSlidesCustomDataVersion2">
-      <go:slidesCustomData xmlns:go="http://customooxmlschemas.google.com/" xmlns:ahyp="http://schemas.microsoft.com/office/drawing/2018/hyperlinkcolor" xmlns:p15="http://schemas.microsoft.com/office/powerpoint/2012/main" xmlns:p14="http://schemas.microsoft.com/office/powerpoint/2010/main" xmlns:com="http://schemas.openxmlformats.org/drawingml/2006/compatibility" xmlns:pvml="urn:schemas-microsoft-com:office:powerpoint" xmlns:v="urn:schemas-microsoft-com:vml" xmlns:o="urn:schemas-microsoft-com:office:office" xmlns:dgm="http://schemas.openxmlformats.org/drawingml/2006/diagram" xmlns:c="http://schemas.openxmlformats.org/drawingml/2006/chart" xmlns:mv="urn:schemas-microsoft-com:mac:vml" xmlns:mc="http://schemas.openxmlformats.org/markup-compatibility/2006" xmlns="" r:id="rId20" roundtripDataSignature="AMtx7miDCxK2ZXgnnNZVs5wxL2S5y01F7A=="/>
+      <go:slidesCustomData xmlns="" xmlns:mc="http://schemas.openxmlformats.org/markup-compatibility/2006" xmlns:mv="urn:schemas-microsoft-com:mac:vml" xmlns:c="http://schemas.openxmlformats.org/drawingml/2006/chart" xmlns:dgm="http://schemas.openxmlformats.org/drawingml/2006/diagram" xmlns:o="urn:schemas-microsoft-com:office:office" xmlns:v="urn:schemas-microsoft-com:vml" xmlns:pvml="urn:schemas-microsoft-com:office:powerpoint" xmlns:com="http://schemas.openxmlformats.org/drawingml/2006/compatibility" xmlns:p14="http://schemas.microsoft.com/office/powerpoint/2010/main" xmlns:p15="http://schemas.microsoft.com/office/powerpoint/2012/main" xmlns:ahyp="http://schemas.microsoft.com/office/drawing/2018/hyperlinkcolor" xmlns:go="http://customooxmlschemas.google.com/" r:id="rId20" roundtripDataSignature="AMtx7miDCxK2ZXgnnNZVs5wxL2S5y01F7A=="/>
     </p:ext>
   </p:extLst>
 </p:presentation>
@@ -11102,63 +11102,10 @@
               <a:buNone/>
             </a:pPr>
             <a:r>
-              <a:rPr lang="en-US"/>
+              <a:rPr lang="en-US" dirty="0"/>
               <a:t>ERD</a:t>
             </a:r>
-            <a:endParaRPr/>
-          </a:p>
-        </p:txBody>
-      </p:sp>
-      <p:sp>
-        <p:nvSpPr>
-          <p:cNvPr id="128" name="Google Shape;128;p12"/>
-          <p:cNvSpPr txBox="1">
-            <a:spLocks noGrp="1"/>
-          </p:cNvSpPr>
-          <p:nvPr>
-            <p:ph type="body" idx="1"/>
-          </p:nvPr>
-        </p:nvSpPr>
-        <p:spPr>
-          <a:xfrm>
-            <a:off x="838200" y="1825625"/>
-            <a:ext cx="10515600" cy="4351338"/>
-          </a:xfrm>
-          <a:prstGeom prst="rect">
-            <a:avLst/>
-          </a:prstGeom>
-          <a:noFill/>
-          <a:ln>
-            <a:noFill/>
-          </a:ln>
-        </p:spPr>
-        <p:txBody>
-          <a:bodyPr spcFirstLastPara="1" wrap="square" lIns="91425" tIns="45700" rIns="91425" bIns="45700" anchor="t" anchorCtr="0">
-            <a:normAutofit/>
-          </a:bodyPr>
-          <a:lstStyle/>
-          <a:p>
-            <a:pPr marL="228600" lvl="0" indent="-228600" algn="l" rtl="0">
-              <a:lnSpc>
-                <a:spcPct val="150000"/>
-              </a:lnSpc>
-              <a:spcBef>
-                <a:spcPts val="0"/>
-              </a:spcBef>
-              <a:spcAft>
-                <a:spcPts val="0"/>
-              </a:spcAft>
-              <a:buClr>
-                <a:schemeClr val="dk1"/>
-              </a:buClr>
-              <a:buSzPts val="2800"/>
-              <a:buChar char="•"/>
-            </a:pPr>
-            <a:r>
-              <a:rPr lang="en-US"/>
-              <a:t>그림</a:t>
-            </a:r>
-            <a:endParaRPr/>
+            <a:endParaRPr dirty="0"/>
           </a:p>
         </p:txBody>
       </p:sp>
@@ -11184,8 +11131,8 @@
         </p:blipFill>
         <p:spPr>
           <a:xfrm>
-            <a:off x="2991665" y="0"/>
-            <a:ext cx="6208669" cy="6858000"/>
+            <a:off x="2219417" y="146481"/>
+            <a:ext cx="8966447" cy="6565037"/>
           </a:xfrm>
           <a:prstGeom prst="rect">
             <a:avLst/>

</xml_diff>